<commit_message>
create pdf file from ppt
</commit_message>
<xml_diff>
--- a/PROJECT REPORT/Climate Change.pptx
+++ b/PROJECT REPORT/Climate Change.pptx
@@ -11,8 +11,7 @@
     <p:sldId id="259" r:id="rId5"/>
     <p:sldId id="260" r:id="rId6"/>
     <p:sldId id="261" r:id="rId7"/>
-    <p:sldId id="263" r:id="rId8"/>
-    <p:sldId id="262" r:id="rId9"/>
+    <p:sldId id="262" r:id="rId8"/>
   </p:sldIdLst>
   <p:sldSz cx="12192000" cy="6858000"/>
   <p:notesSz cx="6858000" cy="9144000"/>
@@ -111,6 +110,11 @@
       </a:defRPr>
     </a:lvl9pPr>
   </p:defaultTextStyle>
+  <p:extLst>
+    <p:ext uri="{EFAFB233-063F-42B5-8137-9DF3F51BA10A}">
+      <p15:sldGuideLst xmlns:p15="http://schemas.microsoft.com/office/powerpoint/2012/main"/>
+    </p:ext>
+  </p:extLst>
 </p:presentation>
 </file>
 
@@ -3338,7 +3342,7 @@
       </p:grpSpPr>
       <p:sp useBgFill="1">
         <p:nvSpPr>
-          <p:cNvPr id="22" name="Rectangle 21">
+          <p:cNvPr id="29" name="Rectangle 28">
             <a:extLst>
               <a:ext uri="{FF2B5EF4-FFF2-40B4-BE49-F238E27FC236}">
                 <a16:creationId xmlns:a16="http://schemas.microsoft.com/office/drawing/2014/main" id="{8A94871E-96FC-4ADE-815B-41A636E34F1A}"/>
@@ -3462,34 +3466,39 @@
           <a:p>
             <a:pPr algn="l"/>
             <a:r>
-              <a:rPr lang="en-US" b="1" dirty="0"/>
-              <a:t>[Yugank Singh]</a:t>
+              <a:rPr lang="en-US" sz="1900" b="1" dirty="0"/>
+              <a:t>Yugank Singh</a:t>
             </a:r>
           </a:p>
           <a:p>
             <a:pPr algn="l"/>
             <a:r>
-              <a:rPr lang="en-US" dirty="0"/>
-              <a:t> </a:t>
-            </a:r>
-            <a:r>
-              <a:rPr lang="en-US" b="1" dirty="0"/>
-              <a:t>[yugank942@gmail.com] </a:t>
+              <a:rPr lang="en-US" sz="1900" b="1" dirty="0"/>
+              <a:t>yugank942@gmail.com]</a:t>
             </a:r>
           </a:p>
           <a:p>
             <a:pPr algn="l"/>
             <a:r>
-              <a:rPr lang="en-US" b="1" dirty="0"/>
-              <a:t>[8052128256]</a:t>
-            </a:r>
-            <a:endParaRPr lang="en-US" dirty="0"/>
-          </a:p>
-        </p:txBody>
-      </p:sp>
-      <p:sp>
-        <p:nvSpPr>
-          <p:cNvPr id="24" name="sketch line">
+              <a:rPr lang="en-US" sz="1900" b="1" dirty="0"/>
+              <a:t>8052128256</a:t>
+            </a:r>
+          </a:p>
+          <a:p>
+            <a:pPr algn="l"/>
+            <a:r>
+              <a:rPr lang="en-US" sz="1900" b="1" i="1" dirty="0">
+                <a:hlinkClick r:id="rId2"/>
+              </a:rPr>
+              <a:t>GITHUB</a:t>
+            </a:r>
+            <a:endParaRPr lang="en-US" sz="1900" b="1" i="1" dirty="0"/>
+          </a:p>
+        </p:txBody>
+      </p:sp>
+      <p:sp>
+        <p:nvSpPr>
+          <p:cNvPr id="31" name="sketch line">
             <a:extLst>
               <a:ext uri="{FF2B5EF4-FFF2-40B4-BE49-F238E27FC236}">
                 <a16:creationId xmlns:a16="http://schemas.microsoft.com/office/drawing/2014/main" id="{3FCFB1DE-0B7E-48CC-BA90-B2AB0889F9D6}"/>
@@ -3845,13 +3854,13 @@
           <p:nvPr/>
         </p:nvPicPr>
         <p:blipFill>
-          <a:blip r:embed="rId2">
+          <a:blip r:embed="rId3">
             <a:extLst>
               <a:ext uri="{28A0092B-C50C-407E-A947-70E740481C1C}">
                 <a14:useLocalDpi xmlns:a14="http://schemas.microsoft.com/office/drawing/2010/main" val="0"/>
               </a:ext>
               <a:ext uri="{96DAC541-7B7A-43D3-8B79-37D633B846F1}">
-                <asvg:svgBlip xmlns:asvg="http://schemas.microsoft.com/office/drawing/2016/SVG/main" r:embed="rId3"/>
+                <asvg:svgBlip xmlns:asvg="http://schemas.microsoft.com/office/drawing/2016/SVG/main" r:embed="rId4"/>
               </a:ext>
             </a:extLst>
           </a:blip>
@@ -3909,10 +3918,10 @@
       </p:grpSpPr>
       <p:sp useBgFill="1">
         <p:nvSpPr>
-          <p:cNvPr id="8" name="Rectangle 7">
-            <a:extLst>
-              <a:ext uri="{FF2B5EF4-FFF2-40B4-BE49-F238E27FC236}">
-                <a16:creationId xmlns:a16="http://schemas.microsoft.com/office/drawing/2014/main" id="{09588DA8-065E-4F6F-8EFD-43104AB2E0CF}"/>
+          <p:cNvPr id="46" name="Rectangle 45">
+            <a:extLst>
+              <a:ext uri="{FF2B5EF4-FFF2-40B4-BE49-F238E27FC236}">
+                <a16:creationId xmlns:a16="http://schemas.microsoft.com/office/drawing/2014/main" id="{DEE2AD96-B495-4E06-9291-B71706F728CB}"/>
               </a:ext>
               <a:ext uri="{C183D7F6-B498-43B3-948B-1728B52AA6E4}">
                 <adec:decorative xmlns:adec="http://schemas.microsoft.com/office/drawing/2017/decorative" val="1"/>
@@ -3983,12 +3992,12 @@
           </a:p>
         </p:txBody>
       </p:sp>
-      <p:sp useBgFill="1">
-        <p:nvSpPr>
-          <p:cNvPr id="10" name="Rectangle 9">
-            <a:extLst>
-              <a:ext uri="{FF2B5EF4-FFF2-40B4-BE49-F238E27FC236}">
-                <a16:creationId xmlns:a16="http://schemas.microsoft.com/office/drawing/2014/main" id="{C4285719-470E-454C-AF62-8323075F1F5B}"/>
+      <p:sp>
+        <p:nvSpPr>
+          <p:cNvPr id="47" name="Rectangle 46">
+            <a:extLst>
+              <a:ext uri="{FF2B5EF4-FFF2-40B4-BE49-F238E27FC236}">
+                <a16:creationId xmlns:a16="http://schemas.microsoft.com/office/drawing/2014/main" id="{53CF6D67-C5A8-4ADD-9E8E-1E38CA1D3166}"/>
               </a:ext>
               <a:ext uri="{C183D7F6-B498-43B3-948B-1728B52AA6E4}">
                 <adec:decorative xmlns:adec="http://schemas.microsoft.com/office/drawing/2017/decorative" val="1"/>
@@ -4007,85 +4016,9 @@
           </p:nvPr>
         </p:nvSpPr>
         <p:spPr>
-          <a:xfrm>
-            <a:off x="0" y="0"/>
-            <a:ext cx="12188952" cy="6858000"/>
-          </a:xfrm>
-          <a:prstGeom prst="rect">
-            <a:avLst/>
-          </a:prstGeom>
-          <a:ln w="12700" cap="flat" cmpd="sng" algn="ctr">
-            <a:noFill/>
-            <a:prstDash val="solid"/>
-            <a:miter lim="800000"/>
-          </a:ln>
-          <a:effectLst/>
-          <a:extLst>
-            <a:ext uri="{91240B29-F687-4F45-9708-019B960494DF}">
-              <a14:hiddenLine xmlns:a14="http://schemas.microsoft.com/office/drawing/2010/main" w="12700" cap="flat" cmpd="sng" algn="ctr">
-                <a:solidFill>
-                  <a:schemeClr val="accent1">
-                    <a:shade val="50000"/>
-                  </a:schemeClr>
-                </a:solidFill>
-                <a:prstDash val="solid"/>
-                <a:miter lim="800000"/>
-              </a14:hiddenLine>
-            </a:ext>
-          </a:extLst>
-        </p:spPr>
-        <p:style>
-          <a:lnRef idx="2">
-            <a:schemeClr val="accent1">
-              <a:shade val="50000"/>
-            </a:schemeClr>
-          </a:lnRef>
-          <a:fillRef idx="1">
-            <a:schemeClr val="accent1"/>
-          </a:fillRef>
-          <a:effectRef idx="0">
-            <a:schemeClr val="accent1"/>
-          </a:effectRef>
-          <a:fontRef idx="minor">
-            <a:schemeClr val="lt1"/>
-          </a:fontRef>
-        </p:style>
-        <p:txBody>
-          <a:bodyPr rtlCol="0" anchor="ctr"/>
-          <a:lstStyle/>
-          <a:p>
-            <a:pPr algn="ctr"/>
-            <a:endParaRPr lang="en-US"/>
-          </a:p>
-        </p:txBody>
-      </p:sp>
-      <p:sp>
-        <p:nvSpPr>
-          <p:cNvPr id="12" name="Rectangle 11">
-            <a:extLst>
-              <a:ext uri="{FF2B5EF4-FFF2-40B4-BE49-F238E27FC236}">
-                <a16:creationId xmlns:a16="http://schemas.microsoft.com/office/drawing/2014/main" id="{CD9FE4EF-C4D8-49A0-B2FF-81D8DB7D8A24}"/>
-              </a:ext>
-              <a:ext uri="{C183D7F6-B498-43B3-948B-1728B52AA6E4}">
-                <adec:decorative xmlns:adec="http://schemas.microsoft.com/office/drawing/2017/decorative" val="1"/>
-              </a:ext>
-            </a:extLst>
-          </p:cNvPr>
-          <p:cNvSpPr>
-            <a:spLocks noGrp="1" noRot="1" noChangeAspect="1" noMove="1" noResize="1" noEditPoints="1" noAdjustHandles="1" noChangeArrowheads="1" noChangeShapeType="1" noTextEdit="1"/>
-          </p:cNvSpPr>
-          <p:nvPr>
-            <p:extLst>
-              <p:ext uri="{386F3935-93C4-4BCD-93E2-E3B085C9AB24}">
-                <p16:designElem xmlns:p16="http://schemas.microsoft.com/office/powerpoint/2015/main" val="1"/>
-              </p:ext>
-            </p:extLst>
-          </p:nvPr>
-        </p:nvSpPr>
-        <p:spPr>
           <a:xfrm rot="5400000" flipH="1">
-            <a:off x="-1410084" y="1410082"/>
-            <a:ext cx="6858000" cy="4037836"/>
+            <a:off x="-638515" y="639280"/>
+            <a:ext cx="6858000" cy="5579440"/>
           </a:xfrm>
           <a:prstGeom prst="rect">
             <a:avLst/>
@@ -4134,10 +4067,10 @@
       </p:sp>
       <p:sp>
         <p:nvSpPr>
-          <p:cNvPr id="14" name="Rectangle 13">
-            <a:extLst>
-              <a:ext uri="{FF2B5EF4-FFF2-40B4-BE49-F238E27FC236}">
-                <a16:creationId xmlns:a16="http://schemas.microsoft.com/office/drawing/2014/main" id="{4300840D-0A0B-4512-BACA-B439D5B9C57C}"/>
+          <p:cNvPr id="48" name="Rectangle 47">
+            <a:extLst>
+              <a:ext uri="{FF2B5EF4-FFF2-40B4-BE49-F238E27FC236}">
+                <a16:creationId xmlns:a16="http://schemas.microsoft.com/office/drawing/2014/main" id="{86909FA0-B515-4681-B7A8-FA281D133B94}"/>
               </a:ext>
               <a:ext uri="{C183D7F6-B498-43B3-948B-1728B52AA6E4}">
                 <adec:decorative xmlns:adec="http://schemas.microsoft.com/office/drawing/2017/decorative" val="1"/>
@@ -4157,8 +4090,8 @@
         </p:nvSpPr>
         <p:spPr>
           <a:xfrm rot="5400000" flipH="1">
-            <a:off x="-1410085" y="1420219"/>
-            <a:ext cx="6857999" cy="4037839"/>
+            <a:off x="-393206" y="395206"/>
+            <a:ext cx="6346209" cy="5576080"/>
           </a:xfrm>
           <a:prstGeom prst="rect">
             <a:avLst/>
@@ -4172,7 +4105,7 @@
               </a:gs>
               <a:gs pos="99000">
                 <a:schemeClr val="accent1">
-                  <a:alpha val="46000"/>
+                  <a:alpha val="0"/>
                 </a:schemeClr>
               </a:gs>
             </a:gsLst>
@@ -4209,10 +4142,10 @@
       </p:sp>
       <p:sp>
         <p:nvSpPr>
-          <p:cNvPr id="16" name="Rectangle 15">
-            <a:extLst>
-              <a:ext uri="{FF2B5EF4-FFF2-40B4-BE49-F238E27FC236}">
-                <a16:creationId xmlns:a16="http://schemas.microsoft.com/office/drawing/2014/main" id="{D2B78728-A580-49A7-84F9-6EF6F583ADE0}"/>
+          <p:cNvPr id="49" name="Rectangle 48">
+            <a:extLst>
+              <a:ext uri="{FF2B5EF4-FFF2-40B4-BE49-F238E27FC236}">
+                <a16:creationId xmlns:a16="http://schemas.microsoft.com/office/drawing/2014/main" id="{21C9FE86-FCC3-4A31-AA1C-C882262B7FE7}"/>
               </a:ext>
               <a:ext uri="{C183D7F6-B498-43B3-948B-1728B52AA6E4}">
                 <adec:decorative xmlns:adec="http://schemas.microsoft.com/office/drawing/2017/decorative" val="1"/>
@@ -4232,8 +4165,8 @@
         </p:nvSpPr>
         <p:spPr>
           <a:xfrm rot="5400000" flipH="1">
-            <a:off x="767923" y="3588085"/>
-            <a:ext cx="2501979" cy="4037841"/>
+            <a:off x="1528907" y="2818967"/>
+            <a:ext cx="2501979" cy="5576080"/>
           </a:xfrm>
           <a:prstGeom prst="rect">
             <a:avLst/>
@@ -4284,10 +4217,10 @@
       </p:sp>
       <p:sp>
         <p:nvSpPr>
-          <p:cNvPr id="18" name="Freeform: Shape 17">
-            <a:extLst>
-              <a:ext uri="{FF2B5EF4-FFF2-40B4-BE49-F238E27FC236}">
-                <a16:creationId xmlns:a16="http://schemas.microsoft.com/office/drawing/2014/main" id="{38FAA1A1-D861-433F-88FA-1E9D6FD31D11}"/>
+          <p:cNvPr id="50" name="Rectangle 49">
+            <a:extLst>
+              <a:ext uri="{FF2B5EF4-FFF2-40B4-BE49-F238E27FC236}">
+                <a16:creationId xmlns:a16="http://schemas.microsoft.com/office/drawing/2014/main" id="{7D96243B-ECED-4B71-8E06-AE9A285EAD20}"/>
               </a:ext>
               <a:ext uri="{C183D7F6-B498-43B3-948B-1728B52AA6E4}">
                 <adec:decorative xmlns:adec="http://schemas.microsoft.com/office/drawing/2017/decorative" val="1"/>
@@ -4306,120 +4239,27 @@
           </p:nvPr>
         </p:nvSpPr>
         <p:spPr>
-          <a:xfrm rot="20635413">
-            <a:off x="-501737" y="969718"/>
-            <a:ext cx="3900357" cy="4178958"/>
+          <a:xfrm rot="5400000" flipH="1">
+            <a:off x="-425002" y="852793"/>
+            <a:ext cx="6858001" cy="5152412"/>
           </a:xfrm>
-          <a:custGeom>
+          <a:prstGeom prst="rect">
             <a:avLst/>
-            <a:gdLst>
-              <a:gd name="connsiteX0" fmla="*/ 2432225 w 3900357"/>
-              <a:gd name="connsiteY0" fmla="*/ 93939 h 4178958"/>
-              <a:gd name="connsiteX1" fmla="*/ 3900357 w 3900357"/>
-              <a:gd name="connsiteY1" fmla="*/ 2089479 h 4178958"/>
-              <a:gd name="connsiteX2" fmla="*/ 1810878 w 3900357"/>
-              <a:gd name="connsiteY2" fmla="*/ 4178958 h 4178958"/>
-              <a:gd name="connsiteX3" fmla="*/ 78249 w 3900357"/>
-              <a:gd name="connsiteY3" fmla="*/ 3257727 h 4178958"/>
-              <a:gd name="connsiteX4" fmla="*/ 0 w 3900357"/>
-              <a:gd name="connsiteY4" fmla="*/ 3128923 h 4178958"/>
-              <a:gd name="connsiteX5" fmla="*/ 831324 w 3900357"/>
-              <a:gd name="connsiteY5" fmla="*/ 244281 h 4178958"/>
-              <a:gd name="connsiteX6" fmla="*/ 997559 w 3900357"/>
-              <a:gd name="connsiteY6" fmla="*/ 164202 h 4178958"/>
-              <a:gd name="connsiteX7" fmla="*/ 1810878 w 3900357"/>
-              <a:gd name="connsiteY7" fmla="*/ 0 h 4178958"/>
-              <a:gd name="connsiteX8" fmla="*/ 2432225 w 3900357"/>
-              <a:gd name="connsiteY8" fmla="*/ 93939 h 4178958"/>
-            </a:gdLst>
-            <a:ahLst/>
-            <a:cxnLst>
-              <a:cxn ang="0">
-                <a:pos x="connsiteX0" y="connsiteY0"/>
-              </a:cxn>
-              <a:cxn ang="0">
-                <a:pos x="connsiteX1" y="connsiteY1"/>
-              </a:cxn>
-              <a:cxn ang="0">
-                <a:pos x="connsiteX2" y="connsiteY2"/>
-              </a:cxn>
-              <a:cxn ang="0">
-                <a:pos x="connsiteX3" y="connsiteY3"/>
-              </a:cxn>
-              <a:cxn ang="0">
-                <a:pos x="connsiteX4" y="connsiteY4"/>
-              </a:cxn>
-              <a:cxn ang="0">
-                <a:pos x="connsiteX5" y="connsiteY5"/>
-              </a:cxn>
-              <a:cxn ang="0">
-                <a:pos x="connsiteX6" y="connsiteY6"/>
-              </a:cxn>
-              <a:cxn ang="0">
-                <a:pos x="connsiteX7" y="connsiteY7"/>
-              </a:cxn>
-              <a:cxn ang="0">
-                <a:pos x="connsiteX8" y="connsiteY8"/>
-              </a:cxn>
-            </a:cxnLst>
-            <a:rect l="l" t="t" r="r" b="b"/>
-            <a:pathLst>
-              <a:path w="3900357" h="4178958">
-                <a:moveTo>
-                  <a:pt x="2432225" y="93939"/>
-                </a:moveTo>
-                <a:cubicBezTo>
-                  <a:pt x="3282786" y="358491"/>
-                  <a:pt x="3900357" y="1151865"/>
-                  <a:pt x="3900357" y="2089479"/>
-                </a:cubicBezTo>
-                <a:cubicBezTo>
-                  <a:pt x="3900357" y="3243466"/>
-                  <a:pt x="2964865" y="4178958"/>
-                  <a:pt x="1810878" y="4178958"/>
-                </a:cubicBezTo>
-                <a:cubicBezTo>
-                  <a:pt x="1089636" y="4178958"/>
-                  <a:pt x="453744" y="3813531"/>
-                  <a:pt x="78249" y="3257727"/>
-                </a:cubicBezTo>
-                <a:lnTo>
-                  <a:pt x="0" y="3128923"/>
-                </a:lnTo>
-                <a:lnTo>
-                  <a:pt x="831324" y="244281"/>
-                </a:lnTo>
-                <a:lnTo>
-                  <a:pt x="997559" y="164202"/>
-                </a:lnTo>
-                <a:cubicBezTo>
-                  <a:pt x="1247540" y="58468"/>
-                  <a:pt x="1522381" y="0"/>
-                  <a:pt x="1810878" y="0"/>
-                </a:cubicBezTo>
-                <a:cubicBezTo>
-                  <a:pt x="2027251" y="0"/>
-                  <a:pt x="2235942" y="32888"/>
-                  <a:pt x="2432225" y="93939"/>
-                </a:cubicBezTo>
-                <a:close/>
-              </a:path>
-            </a:pathLst>
-          </a:custGeom>
+          </a:prstGeom>
           <a:gradFill>
             <a:gsLst>
-              <a:gs pos="29000">
+              <a:gs pos="0">
                 <a:srgbClr val="000000">
                   <a:alpha val="0"/>
                 </a:srgbClr>
               </a:gs>
-              <a:gs pos="100000">
+              <a:gs pos="99000">
                 <a:schemeClr val="accent1">
-                  <a:alpha val="43000"/>
+                  <a:alpha val="11000"/>
                 </a:schemeClr>
               </a:gs>
             </a:gsLst>
-            <a:lin ang="1800000" scaled="0"/>
+            <a:lin ang="7800000" scaled="0"/>
           </a:gradFill>
           <a:ln>
             <a:noFill/>
@@ -4442,22 +4282,20 @@
           </a:fontRef>
         </p:style>
         <p:txBody>
-          <a:bodyPr wrap="square" rtlCol="0" anchor="ctr">
-            <a:noAutofit/>
-          </a:bodyPr>
+          <a:bodyPr rtlCol="0" anchor="ctr"/>
           <a:lstStyle/>
           <a:p>
             <a:pPr algn="ctr"/>
-            <a:endParaRPr lang="en-US" dirty="0"/>
-          </a:p>
-        </p:txBody>
-      </p:sp>
-      <p:sp>
-        <p:nvSpPr>
-          <p:cNvPr id="20" name="Rectangle 19">
-            <a:extLst>
-              <a:ext uri="{FF2B5EF4-FFF2-40B4-BE49-F238E27FC236}">
-                <a16:creationId xmlns:a16="http://schemas.microsoft.com/office/drawing/2014/main" id="{8D71EDA1-87BF-4D5D-AB79-F346FD19278A}"/>
+            <a:endParaRPr lang="en-US"/>
+          </a:p>
+        </p:txBody>
+      </p:sp>
+      <p:sp>
+        <p:nvSpPr>
+          <p:cNvPr id="51" name="Oval 50">
+            <a:extLst>
+              <a:ext uri="{FF2B5EF4-FFF2-40B4-BE49-F238E27FC236}">
+                <a16:creationId xmlns:a16="http://schemas.microsoft.com/office/drawing/2014/main" id="{A09989E4-EFDC-4A90-A633-E0525FB4139E}"/>
               </a:ext>
               <a:ext uri="{C183D7F6-B498-43B3-948B-1728B52AA6E4}">
                 <adec:decorative xmlns:adec="http://schemas.microsoft.com/office/drawing/2017/decorative" val="1"/>
@@ -4476,29 +4314,29 @@
           </p:nvPr>
         </p:nvSpPr>
         <p:spPr>
-          <a:xfrm rot="5400000" flipH="1">
-            <a:off x="-1410093" y="1399943"/>
-            <a:ext cx="6858003" cy="4037835"/>
+          <a:xfrm rot="6097846">
+            <a:off x="818753" y="1128497"/>
+            <a:ext cx="4318303" cy="4318303"/>
           </a:xfrm>
-          <a:prstGeom prst="rect">
+          <a:prstGeom prst="ellipse">
             <a:avLst/>
           </a:prstGeom>
           <a:gradFill>
             <a:gsLst>
-              <a:gs pos="0">
-                <a:srgbClr val="000000">
+              <a:gs pos="39000">
+                <a:schemeClr val="accent1">
                   <a:alpha val="0"/>
-                </a:srgbClr>
+                </a:schemeClr>
               </a:gs>
-              <a:gs pos="99000">
+              <a:gs pos="100000">
                 <a:schemeClr val="accent1">
                   <a:lumMod val="60000"/>
                   <a:lumOff val="40000"/>
-                  <a:alpha val="11000"/>
+                  <a:alpha val="15000"/>
                 </a:schemeClr>
               </a:gs>
             </a:gsLst>
-            <a:lin ang="7200000" scaled="0"/>
+            <a:lin ang="17400000" scaled="0"/>
           </a:gradFill>
           <a:ln>
             <a:noFill/>
@@ -4525,16 +4363,16 @@
           <a:lstStyle/>
           <a:p>
             <a:pPr algn="ctr"/>
-            <a:endParaRPr lang="en-US"/>
-          </a:p>
-        </p:txBody>
-      </p:sp>
-      <p:sp>
-        <p:nvSpPr>
-          <p:cNvPr id="3" name="Content Placeholder 2">
-            <a:extLst>
-              <a:ext uri="{FF2B5EF4-FFF2-40B4-BE49-F238E27FC236}">
-                <a16:creationId xmlns:a16="http://schemas.microsoft.com/office/drawing/2014/main" id="{6677329B-10EE-65AC-B388-1810226C5693}"/>
+            <a:endParaRPr lang="en-US" dirty="0"/>
+          </a:p>
+        </p:txBody>
+      </p:sp>
+      <p:sp>
+        <p:nvSpPr>
+          <p:cNvPr id="2" name="Title 1">
+            <a:extLst>
+              <a:ext uri="{FF2B5EF4-FFF2-40B4-BE49-F238E27FC236}">
+                <a16:creationId xmlns:a16="http://schemas.microsoft.com/office/drawing/2014/main" id="{1EBF6DD0-1335-7296-660F-3187A69A761D}"/>
               </a:ext>
             </a:extLst>
           </p:cNvPr>
@@ -4542,28 +4380,86 @@
             <a:spLocks noGrp="1"/>
           </p:cNvSpPr>
           <p:nvPr>
-            <p:ph idx="1"/>
+            <p:ph type="ctrTitle"/>
           </p:nvPr>
         </p:nvSpPr>
         <p:spPr>
           <a:xfrm>
-            <a:off x="4810259" y="649480"/>
-            <a:ext cx="6555347" cy="5546047"/>
+            <a:off x="826396" y="586855"/>
+            <a:ext cx="4230100" cy="3387497"/>
           </a:xfrm>
         </p:spPr>
         <p:txBody>
-          <a:bodyPr anchor="ctr">
+          <a:bodyPr vert="horz" lIns="91440" tIns="45720" rIns="91440" bIns="45720" rtlCol="0" anchor="b">
             <a:normAutofit/>
           </a:bodyPr>
           <a:lstStyle/>
           <a:p>
-            <a:r>
-              <a:rPr lang="en-US" sz="2000" b="1" dirty="0"/>
-              <a:t>Project Files:</a:t>
-            </a:r>
-            <a:endParaRPr lang="en-US" sz="2000" dirty="0"/>
-          </a:p>
-          <a:p>
+            <a:pPr algn="r"/>
+            <a:r>
+              <a:rPr lang="en-US" sz="4000" b="1" kern="1200">
+                <a:solidFill>
+                  <a:srgbClr val="FFFFFF"/>
+                </a:solidFill>
+                <a:latin typeface="+mj-lt"/>
+                <a:ea typeface="+mj-ea"/>
+                <a:cs typeface="+mj-cs"/>
+              </a:rPr>
+              <a:t>Project Files</a:t>
+            </a:r>
+            <a:br>
+              <a:rPr lang="en-US" sz="4000" kern="1200">
+                <a:solidFill>
+                  <a:srgbClr val="FFFFFF"/>
+                </a:solidFill>
+                <a:latin typeface="+mj-lt"/>
+                <a:ea typeface="+mj-ea"/>
+                <a:cs typeface="+mj-cs"/>
+              </a:rPr>
+            </a:br>
+            <a:endParaRPr lang="en-US" sz="4000" kern="1200" dirty="0">
+              <a:solidFill>
+                <a:srgbClr val="FFFFFF"/>
+              </a:solidFill>
+              <a:latin typeface="+mj-lt"/>
+              <a:ea typeface="+mj-ea"/>
+              <a:cs typeface="+mj-cs"/>
+            </a:endParaRPr>
+          </a:p>
+        </p:txBody>
+      </p:sp>
+      <p:sp>
+        <p:nvSpPr>
+          <p:cNvPr id="3" name="Content Placeholder 2">
+            <a:extLst>
+              <a:ext uri="{FF2B5EF4-FFF2-40B4-BE49-F238E27FC236}">
+                <a16:creationId xmlns:a16="http://schemas.microsoft.com/office/drawing/2014/main" id="{6677329B-10EE-65AC-B388-1810226C5693}"/>
+              </a:ext>
+            </a:extLst>
+          </p:cNvPr>
+          <p:cNvSpPr>
+            <a:spLocks noGrp="1"/>
+          </p:cNvSpPr>
+          <p:nvPr>
+            <p:ph type="subTitle" idx="1"/>
+          </p:nvPr>
+        </p:nvSpPr>
+        <p:spPr>
+          <a:xfrm>
+            <a:off x="6503158" y="649480"/>
+            <a:ext cx="4862447" cy="5546047"/>
+          </a:xfrm>
+        </p:spPr>
+        <p:txBody>
+          <a:bodyPr vert="horz" lIns="91440" tIns="45720" rIns="91440" bIns="45720" rtlCol="0" anchor="ctr">
+            <a:normAutofit/>
+          </a:bodyPr>
+          <a:lstStyle/>
+          <a:p>
+            <a:pPr indent="-228600" algn="l">
+              <a:buFont typeface="Arial" panose="020B0604020202020204" pitchFamily="34" charset="0"/>
+              <a:buChar char="•"/>
+            </a:pPr>
             <a:r>
               <a:rPr lang="en-US" sz="2000" b="1" dirty="0"/>
               <a:t>Excel Dashboard:</a:t>
@@ -4573,14 +4469,18 @@
               <a:t> </a:t>
             </a:r>
             <a:r>
-              <a:rPr lang="en-US" sz="2000" dirty="0">
+              <a:rPr lang="en-US" sz="2000" b="1" i="1" dirty="0">
                 <a:hlinkClick r:id="rId2"/>
               </a:rPr>
               <a:t>LINK</a:t>
             </a:r>
-            <a:endParaRPr lang="en-US" sz="2000" dirty="0"/>
-          </a:p>
-          <a:p>
+            <a:endParaRPr lang="en-US" sz="2000" b="1" i="1" dirty="0"/>
+          </a:p>
+          <a:p>
+            <a:pPr indent="-228600" algn="l">
+              <a:buFont typeface="Arial" panose="020B0604020202020204" pitchFamily="34" charset="0"/>
+              <a:buChar char="•"/>
+            </a:pPr>
             <a:r>
               <a:rPr lang="en-US" sz="2000" dirty="0"/>
               <a:t> </a:t>
@@ -4593,9 +4493,19 @@
               <a:rPr lang="en-US" sz="2000" i="1" dirty="0"/>
               <a:t> For full interactivity, please download the file and open it in the Microsoft Excel desktop app. The web preview may not display correctly.</a:t>
             </a:r>
+          </a:p>
+          <a:p>
+            <a:pPr indent="-228600" algn="l">
+              <a:buFont typeface="Arial" panose="020B0604020202020204" pitchFamily="34" charset="0"/>
+              <a:buChar char="•"/>
+            </a:pPr>
             <a:endParaRPr lang="en-US" sz="2000" dirty="0"/>
           </a:p>
           <a:p>
+            <a:pPr indent="-228600" algn="l">
+              <a:buFont typeface="Arial" panose="020B0604020202020204" pitchFamily="34" charset="0"/>
+              <a:buChar char="•"/>
+            </a:pPr>
             <a:r>
               <a:rPr lang="en-US" sz="2000" i="1" dirty="0"/>
               <a:t> </a:t>
@@ -4609,14 +4519,81 @@
               <a:t> </a:t>
             </a:r>
             <a:r>
-              <a:rPr lang="en-US" sz="2000" dirty="0">
-                <a:hlinkClick r:id="rId2"/>
+              <a:rPr lang="en-US" sz="2000" b="1" i="1" dirty="0">
+                <a:hlinkClick r:id="rId3"/>
               </a:rPr>
-              <a:t>LINK</a:t>
-            </a:r>
-            <a:endParaRPr lang="en-US" sz="2000" dirty="0"/>
-          </a:p>
-          <a:p>
+              <a:t>GITHUB LINK</a:t>
+            </a:r>
+            <a:endParaRPr lang="en-US" sz="2000" b="1" i="1" dirty="0"/>
+          </a:p>
+          <a:p>
+            <a:pPr indent="-228600" algn="l">
+              <a:buFont typeface="Arial" panose="020B0604020202020204" pitchFamily="34" charset="0"/>
+              <a:buChar char="•"/>
+            </a:pPr>
+            <a:r>
+              <a:rPr lang="en-US" sz="2000" b="1" i="1" dirty="0"/>
+              <a:t>Please Note:</a:t>
+            </a:r>
+            <a:r>
+              <a:rPr lang="en-US" sz="2000" i="1" dirty="0"/>
+              <a:t> The Power BI project file </a:t>
+            </a:r>
+            <a:r>
+              <a:rPr lang="en-US" sz="2000" b="1" i="1" dirty="0"/>
+              <a:t>(.</a:t>
+            </a:r>
+            <a:r>
+              <a:rPr lang="en-US" sz="2000" b="1" i="1" dirty="0" err="1"/>
+              <a:t>pbix</a:t>
+            </a:r>
+            <a:r>
+              <a:rPr lang="en-US" sz="2000" b="1" i="1" dirty="0"/>
+              <a:t>) </a:t>
+            </a:r>
+            <a:r>
+              <a:rPr lang="en-US" sz="2000" i="1" dirty="0"/>
+              <a:t>is designed to be viewed in </a:t>
+            </a:r>
+            <a:r>
+              <a:rPr lang="en-US" sz="2000" b="1" i="1" dirty="0"/>
+              <a:t>Microsoft Power BI Desktop</a:t>
+            </a:r>
+            <a:r>
+              <a:rPr lang="en-US" sz="2000" i="1" dirty="0"/>
+              <a:t>.</a:t>
+            </a:r>
+          </a:p>
+          <a:p>
+            <a:pPr indent="-228600" algn="l">
+              <a:buFont typeface="Arial" panose="020B0604020202020204" pitchFamily="34" charset="0"/>
+              <a:buChar char="•"/>
+            </a:pPr>
+            <a:r>
+              <a:rPr lang="en-US" sz="2000" i="1" dirty="0"/>
+              <a:t>To experience the full interactivity of the dashboard, including the DAX measures and custom visuals, please download the .</a:t>
+            </a:r>
+            <a:r>
+              <a:rPr lang="en-US" sz="2000" i="1" dirty="0" err="1"/>
+              <a:t>pbix</a:t>
+            </a:r>
+            <a:r>
+              <a:rPr lang="en-US" sz="2000" i="1" dirty="0"/>
+              <a:t> file from the repository and open it using the Power BI Desktop application.</a:t>
+            </a:r>
+          </a:p>
+          <a:p>
+            <a:pPr indent="-228600" algn="l">
+              <a:buFont typeface="Arial" panose="020B0604020202020204" pitchFamily="34" charset="0"/>
+              <a:buChar char="•"/>
+            </a:pPr>
+            <a:endParaRPr lang="en-US" sz="2000" b="1" i="1" dirty="0"/>
+          </a:p>
+          <a:p>
+            <a:pPr indent="-228600" algn="l">
+              <a:buFont typeface="Arial" panose="020B0604020202020204" pitchFamily="34" charset="0"/>
+              <a:buChar char="•"/>
+            </a:pPr>
             <a:endParaRPr lang="en-US" sz="2000" dirty="0"/>
           </a:p>
         </p:txBody>
@@ -5151,7 +5128,7 @@
         <p:spPr>
           <a:xfrm>
             <a:off x="4601043" y="195459"/>
-            <a:ext cx="6382148" cy="1051021"/>
+            <a:ext cx="6382148" cy="583859"/>
           </a:xfrm>
         </p:spPr>
         <p:txBody>
@@ -5161,7 +5138,7 @@
           <a:lstStyle/>
           <a:p>
             <a:r>
-              <a:rPr lang="en-US" sz="4000" b="1" kern="1200" dirty="0">
+              <a:rPr lang="en-US" sz="4000" b="1" i="1" kern="1200" dirty="0">
                 <a:solidFill>
                   <a:schemeClr val="tx2">
                     <a:lumMod val="75000"/>
@@ -5171,11 +5148,12 @@
                 <a:latin typeface="+mj-lt"/>
                 <a:ea typeface="+mj-ea"/>
                 <a:cs typeface="+mj-cs"/>
+                <a:hlinkClick r:id="rId2"/>
               </a:rPr>
               <a:t>LINK TO .</a:t>
             </a:r>
             <a:r>
-              <a:rPr lang="en-US" sz="4000" b="1" kern="1200" dirty="0" err="1">
+              <a:rPr lang="en-US" sz="4000" b="1" i="1" kern="1200" dirty="0" err="1">
                 <a:solidFill>
                   <a:schemeClr val="tx2">
                     <a:lumMod val="75000"/>
@@ -5185,11 +5163,12 @@
                 <a:latin typeface="+mj-lt"/>
                 <a:ea typeface="+mj-ea"/>
                 <a:cs typeface="+mj-cs"/>
+                <a:hlinkClick r:id="rId2"/>
               </a:rPr>
               <a:t>pbix</a:t>
             </a:r>
             <a:r>
-              <a:rPr lang="en-US" sz="4000" b="1" kern="1200" dirty="0">
+              <a:rPr lang="en-US" sz="4000" b="1" i="1" kern="1200" dirty="0">
                 <a:solidFill>
                   <a:schemeClr val="tx2">
                     <a:lumMod val="75000"/>
@@ -5199,9 +5178,21 @@
                 <a:latin typeface="+mj-lt"/>
                 <a:ea typeface="+mj-ea"/>
                 <a:cs typeface="+mj-cs"/>
+                <a:hlinkClick r:id="rId2"/>
               </a:rPr>
               <a:t> FILE ON GIT HUB</a:t>
             </a:r>
+            <a:endParaRPr lang="en-US" sz="4000" b="1" i="1" kern="1200" dirty="0">
+              <a:solidFill>
+                <a:schemeClr val="tx2">
+                  <a:lumMod val="75000"/>
+                  <a:lumOff val="25000"/>
+                </a:schemeClr>
+              </a:solidFill>
+              <a:latin typeface="+mj-lt"/>
+              <a:ea typeface="+mj-ea"/>
+              <a:cs typeface="+mj-cs"/>
+            </a:endParaRPr>
           </a:p>
         </p:txBody>
       </p:sp>
@@ -5222,7 +5213,7 @@
           </p:nvPr>
         </p:nvPicPr>
         <p:blipFill>
-          <a:blip r:embed="rId2"/>
+          <a:blip r:embed="rId3"/>
           <a:stretch>
             <a:fillRect/>
           </a:stretch>
@@ -5694,8 +5685,8 @@
         </p:nvSpPr>
         <p:spPr>
           <a:xfrm>
-            <a:off x="8572499" y="390832"/>
-            <a:ext cx="3233585" cy="873612"/>
+            <a:off x="8463145" y="99886"/>
+            <a:ext cx="3233585" cy="575523"/>
           </a:xfrm>
           <a:prstGeom prst="rect">
             <a:avLst/>
@@ -5731,16 +5722,25 @@
               </a:spcBef>
             </a:pPr>
             <a:r>
-              <a:rPr lang="en-US" sz="2000" b="1" kern="1200">
+              <a:rPr lang="en-US" sz="2000" b="1" i="1" kern="1200" dirty="0">
                 <a:solidFill>
                   <a:srgbClr val="FFFFFF"/>
                 </a:solidFill>
                 <a:latin typeface="+mn-lt"/>
                 <a:ea typeface="+mn-ea"/>
                 <a:cs typeface="+mn-cs"/>
+                <a:hlinkClick r:id="rId2"/>
               </a:rPr>
               <a:t>FILE LINK</a:t>
             </a:r>
+            <a:endParaRPr lang="en-US" sz="2000" b="1" i="1" kern="1200" dirty="0">
+              <a:solidFill>
+                <a:srgbClr val="FFFFFF"/>
+              </a:solidFill>
+              <a:latin typeface="+mn-lt"/>
+              <a:ea typeface="+mn-ea"/>
+              <a:cs typeface="+mn-cs"/>
+            </a:endParaRPr>
           </a:p>
         </p:txBody>
       </p:sp>
@@ -5761,7 +5761,7 @@
           </p:nvPr>
         </p:nvPicPr>
         <p:blipFill>
-          <a:blip r:embed="rId2"/>
+          <a:blip r:embed="rId3"/>
           <a:stretch>
             <a:fillRect/>
           </a:stretch>
@@ -5776,6 +5776,62 @@
           </a:prstGeom>
         </p:spPr>
       </p:pic>
+      <p:sp>
+        <p:nvSpPr>
+          <p:cNvPr id="4" name="TextBox 3">
+            <a:extLst>
+              <a:ext uri="{FF2B5EF4-FFF2-40B4-BE49-F238E27FC236}">
+                <a16:creationId xmlns:a16="http://schemas.microsoft.com/office/drawing/2014/main" id="{83C63390-94D9-68F9-6629-3352F26C3D44}"/>
+              </a:ext>
+            </a:extLst>
+          </p:cNvPr>
+          <p:cNvSpPr txBox="1"/>
+          <p:nvPr/>
+        </p:nvSpPr>
+        <p:spPr>
+          <a:xfrm>
+            <a:off x="8315325" y="675409"/>
+            <a:ext cx="2054802" cy="369332"/>
+          </a:xfrm>
+          <a:prstGeom prst="rect">
+            <a:avLst/>
+          </a:prstGeom>
+          <a:noFill/>
+        </p:spPr>
+        <p:txBody>
+          <a:bodyPr wrap="square">
+            <a:spAutoFit/>
+          </a:bodyPr>
+          <a:lstStyle/>
+          <a:p>
+            <a:pPr>
+              <a:spcBef>
+                <a:spcPts val="1000"/>
+              </a:spcBef>
+            </a:pPr>
+            <a:r>
+              <a:rPr lang="en-US" sz="1800" b="1" i="1" kern="1200" dirty="0">
+                <a:solidFill>
+                  <a:srgbClr val="FFFFFF"/>
+                </a:solidFill>
+                <a:latin typeface="+mn-lt"/>
+                <a:ea typeface="+mn-ea"/>
+                <a:cs typeface="+mn-cs"/>
+                <a:hlinkClick r:id="rId4"/>
+              </a:rPr>
+              <a:t>GIT HUB LINK</a:t>
+            </a:r>
+            <a:endParaRPr lang="en-US" sz="1800" b="1" i="1" kern="1200" dirty="0">
+              <a:solidFill>
+                <a:srgbClr val="FFFFFF"/>
+              </a:solidFill>
+              <a:latin typeface="+mn-lt"/>
+              <a:ea typeface="+mn-ea"/>
+              <a:cs typeface="+mn-cs"/>
+            </a:endParaRPr>
+          </a:p>
+        </p:txBody>
+      </p:sp>
     </p:spTree>
     <p:extLst>
       <p:ext uri="{BB962C8B-B14F-4D97-AF65-F5344CB8AC3E}">
@@ -7242,86 +7298,6 @@
 </file>
 
 <file path=ppt/slides/slide7.xml><?xml version="1.0" encoding="utf-8"?>
-<p:sld xmlns:a="http://schemas.openxmlformats.org/drawingml/2006/main" xmlns:r="http://schemas.openxmlformats.org/officeDocument/2006/relationships" xmlns:p="http://schemas.openxmlformats.org/presentationml/2006/main">
-  <p:cSld>
-    <p:spTree>
-      <p:nvGrpSpPr>
-        <p:cNvPr id="1" name=""/>
-        <p:cNvGrpSpPr/>
-        <p:nvPr/>
-      </p:nvGrpSpPr>
-      <p:grpSpPr>
-        <a:xfrm>
-          <a:off x="0" y="0"/>
-          <a:ext cx="0" cy="0"/>
-          <a:chOff x="0" y="0"/>
-          <a:chExt cx="0" cy="0"/>
-        </a:xfrm>
-      </p:grpSpPr>
-      <p:sp>
-        <p:nvSpPr>
-          <p:cNvPr id="2" name="Title 1">
-            <a:extLst>
-              <a:ext uri="{FF2B5EF4-FFF2-40B4-BE49-F238E27FC236}">
-                <a16:creationId xmlns:a16="http://schemas.microsoft.com/office/drawing/2014/main" id="{F36CBACE-576C-48E6-4048-CB0CFF04FB74}"/>
-              </a:ext>
-            </a:extLst>
-          </p:cNvPr>
-          <p:cNvSpPr>
-            <a:spLocks noGrp="1"/>
-          </p:cNvSpPr>
-          <p:nvPr>
-            <p:ph type="title"/>
-          </p:nvPr>
-        </p:nvSpPr>
-        <p:spPr/>
-        <p:txBody>
-          <a:bodyPr/>
-          <a:lstStyle/>
-          <a:p>
-            <a:endParaRPr lang="en-US"/>
-          </a:p>
-        </p:txBody>
-      </p:sp>
-      <p:sp>
-        <p:nvSpPr>
-          <p:cNvPr id="3" name="Content Placeholder 2">
-            <a:extLst>
-              <a:ext uri="{FF2B5EF4-FFF2-40B4-BE49-F238E27FC236}">
-                <a16:creationId xmlns:a16="http://schemas.microsoft.com/office/drawing/2014/main" id="{7C0E2473-DF55-C641-1B06-5CFCEA7E25B6}"/>
-              </a:ext>
-            </a:extLst>
-          </p:cNvPr>
-          <p:cNvSpPr>
-            <a:spLocks noGrp="1"/>
-          </p:cNvSpPr>
-          <p:nvPr>
-            <p:ph idx="1"/>
-          </p:nvPr>
-        </p:nvSpPr>
-        <p:spPr/>
-        <p:txBody>
-          <a:bodyPr/>
-          <a:lstStyle/>
-          <a:p>
-            <a:endParaRPr lang="en-US" dirty="0"/>
-          </a:p>
-        </p:txBody>
-      </p:sp>
-    </p:spTree>
-    <p:extLst>
-      <p:ext uri="{BB962C8B-B14F-4D97-AF65-F5344CB8AC3E}">
-        <p14:creationId xmlns:p14="http://schemas.microsoft.com/office/powerpoint/2010/main" val="4222481148"/>
-      </p:ext>
-    </p:extLst>
-  </p:cSld>
-  <p:clrMapOvr>
-    <a:masterClrMapping/>
-  </p:clrMapOvr>
-</p:sld>
-</file>
-
-<file path=ppt/slides/slide8.xml><?xml version="1.0" encoding="utf-8"?>
 <p:sld xmlns:a="http://schemas.openxmlformats.org/drawingml/2006/main" xmlns:r="http://schemas.openxmlformats.org/officeDocument/2006/relationships" xmlns:p="http://schemas.openxmlformats.org/presentationml/2006/main">
   <p:cSld>
     <p:bg>

</xml_diff>